<commit_message>
Add work on PPT
</commit_message>
<xml_diff>
--- a/Git.pptx
+++ b/Git.pptx
@@ -7,6 +7,11 @@
   <p:sldIdLst>
     <p:sldId id="256" r:id="rId2"/>
     <p:sldId id="257" r:id="rId3"/>
+    <p:sldId id="258" r:id="rId4"/>
+    <p:sldId id="259" r:id="rId5"/>
+    <p:sldId id="260" r:id="rId6"/>
+    <p:sldId id="261" r:id="rId7"/>
+    <p:sldId id="262" r:id="rId8"/>
   </p:sldIdLst>
   <p:sldSz cx="9144000" cy="6858000" type="screen4x3"/>
   <p:notesSz cx="6858000" cy="9144000"/>
@@ -289,6 +294,7 @@
           <a:p>
             <a:fld id="{1617B335-51B0-4314-8176-CDAF0F512FD9}" type="datetimeFigureOut">
               <a:rPr lang="en-US" smtClean="0"/>
+              <a:pPr/>
               <a:t>9/24/2015</a:t>
             </a:fld>
             <a:endParaRPr lang="en-US"/>
@@ -331,6 +337,7 @@
           <a:p>
             <a:fld id="{692D2303-E343-4709-A7C1-79D2B34BDE58}" type="slidenum">
               <a:rPr lang="en-US" smtClean="0"/>
+              <a:pPr/>
               <a:t>‹#›</a:t>
             </a:fld>
             <a:endParaRPr lang="en-US"/>
@@ -454,6 +461,7 @@
           <a:p>
             <a:fld id="{1617B335-51B0-4314-8176-CDAF0F512FD9}" type="datetimeFigureOut">
               <a:rPr lang="en-US" smtClean="0"/>
+              <a:pPr/>
               <a:t>9/24/2015</a:t>
             </a:fld>
             <a:endParaRPr lang="en-US"/>
@@ -496,6 +504,7 @@
           <a:p>
             <a:fld id="{692D2303-E343-4709-A7C1-79D2B34BDE58}" type="slidenum">
               <a:rPr lang="en-US" smtClean="0"/>
+              <a:pPr/>
               <a:t>‹#›</a:t>
             </a:fld>
             <a:endParaRPr lang="en-US"/>
@@ -629,6 +638,7 @@
           <a:p>
             <a:fld id="{1617B335-51B0-4314-8176-CDAF0F512FD9}" type="datetimeFigureOut">
               <a:rPr lang="en-US" smtClean="0"/>
+              <a:pPr/>
               <a:t>9/24/2015</a:t>
             </a:fld>
             <a:endParaRPr lang="en-US"/>
@@ -671,6 +681,7 @@
           <a:p>
             <a:fld id="{692D2303-E343-4709-A7C1-79D2B34BDE58}" type="slidenum">
               <a:rPr lang="en-US" smtClean="0"/>
+              <a:pPr/>
               <a:t>‹#›</a:t>
             </a:fld>
             <a:endParaRPr lang="en-US"/>
@@ -794,6 +805,7 @@
           <a:p>
             <a:fld id="{1617B335-51B0-4314-8176-CDAF0F512FD9}" type="datetimeFigureOut">
               <a:rPr lang="en-US" smtClean="0"/>
+              <a:pPr/>
               <a:t>9/24/2015</a:t>
             </a:fld>
             <a:endParaRPr lang="en-US"/>
@@ -836,6 +848,7 @@
           <a:p>
             <a:fld id="{692D2303-E343-4709-A7C1-79D2B34BDE58}" type="slidenum">
               <a:rPr lang="en-US" smtClean="0"/>
+              <a:pPr/>
               <a:t>‹#›</a:t>
             </a:fld>
             <a:endParaRPr lang="en-US"/>
@@ -1035,6 +1048,7 @@
           <a:p>
             <a:fld id="{1617B335-51B0-4314-8176-CDAF0F512FD9}" type="datetimeFigureOut">
               <a:rPr lang="en-US" smtClean="0"/>
+              <a:pPr/>
               <a:t>9/24/2015</a:t>
             </a:fld>
             <a:endParaRPr lang="en-US"/>
@@ -1077,6 +1091,7 @@
           <a:p>
             <a:fld id="{692D2303-E343-4709-A7C1-79D2B34BDE58}" type="slidenum">
               <a:rPr lang="en-US" smtClean="0"/>
+              <a:pPr/>
               <a:t>‹#›</a:t>
             </a:fld>
             <a:endParaRPr lang="en-US"/>
@@ -1318,6 +1333,7 @@
           <a:p>
             <a:fld id="{1617B335-51B0-4314-8176-CDAF0F512FD9}" type="datetimeFigureOut">
               <a:rPr lang="en-US" smtClean="0"/>
+              <a:pPr/>
               <a:t>9/24/2015</a:t>
             </a:fld>
             <a:endParaRPr lang="en-US"/>
@@ -1360,6 +1376,7 @@
           <a:p>
             <a:fld id="{692D2303-E343-4709-A7C1-79D2B34BDE58}" type="slidenum">
               <a:rPr lang="en-US" smtClean="0"/>
+              <a:pPr/>
               <a:t>‹#›</a:t>
             </a:fld>
             <a:endParaRPr lang="en-US"/>
@@ -1735,6 +1752,7 @@
           <a:p>
             <a:fld id="{1617B335-51B0-4314-8176-CDAF0F512FD9}" type="datetimeFigureOut">
               <a:rPr lang="en-US" smtClean="0"/>
+              <a:pPr/>
               <a:t>9/24/2015</a:t>
             </a:fld>
             <a:endParaRPr lang="en-US"/>
@@ -1777,6 +1795,7 @@
           <a:p>
             <a:fld id="{692D2303-E343-4709-A7C1-79D2B34BDE58}" type="slidenum">
               <a:rPr lang="en-US" smtClean="0"/>
+              <a:pPr/>
               <a:t>‹#›</a:t>
             </a:fld>
             <a:endParaRPr lang="en-US"/>
@@ -1848,6 +1867,7 @@
           <a:p>
             <a:fld id="{1617B335-51B0-4314-8176-CDAF0F512FD9}" type="datetimeFigureOut">
               <a:rPr lang="en-US" smtClean="0"/>
+              <a:pPr/>
               <a:t>9/24/2015</a:t>
             </a:fld>
             <a:endParaRPr lang="en-US"/>
@@ -1890,6 +1910,7 @@
           <a:p>
             <a:fld id="{692D2303-E343-4709-A7C1-79D2B34BDE58}" type="slidenum">
               <a:rPr lang="en-US" smtClean="0"/>
+              <a:pPr/>
               <a:t>‹#›</a:t>
             </a:fld>
             <a:endParaRPr lang="en-US"/>
@@ -1938,6 +1959,7 @@
           <a:p>
             <a:fld id="{1617B335-51B0-4314-8176-CDAF0F512FD9}" type="datetimeFigureOut">
               <a:rPr lang="en-US" smtClean="0"/>
+              <a:pPr/>
               <a:t>9/24/2015</a:t>
             </a:fld>
             <a:endParaRPr lang="en-US"/>
@@ -1980,6 +2002,7 @@
           <a:p>
             <a:fld id="{692D2303-E343-4709-A7C1-79D2B34BDE58}" type="slidenum">
               <a:rPr lang="en-US" smtClean="0"/>
+              <a:pPr/>
               <a:t>‹#›</a:t>
             </a:fld>
             <a:endParaRPr lang="en-US"/>
@@ -2210,6 +2233,7 @@
           <a:p>
             <a:fld id="{1617B335-51B0-4314-8176-CDAF0F512FD9}" type="datetimeFigureOut">
               <a:rPr lang="en-US" smtClean="0"/>
+              <a:pPr/>
               <a:t>9/24/2015</a:t>
             </a:fld>
             <a:endParaRPr lang="en-US"/>
@@ -2252,6 +2276,7 @@
           <a:p>
             <a:fld id="{692D2303-E343-4709-A7C1-79D2B34BDE58}" type="slidenum">
               <a:rPr lang="en-US" smtClean="0"/>
+              <a:pPr/>
               <a:t>‹#›</a:t>
             </a:fld>
             <a:endParaRPr lang="en-US"/>
@@ -2458,6 +2483,7 @@
           <a:p>
             <a:fld id="{1617B335-51B0-4314-8176-CDAF0F512FD9}" type="datetimeFigureOut">
               <a:rPr lang="en-US" smtClean="0"/>
+              <a:pPr/>
               <a:t>9/24/2015</a:t>
             </a:fld>
             <a:endParaRPr lang="en-US"/>
@@ -2500,6 +2526,7 @@
           <a:p>
             <a:fld id="{692D2303-E343-4709-A7C1-79D2B34BDE58}" type="slidenum">
               <a:rPr lang="en-US" smtClean="0"/>
+              <a:pPr/>
               <a:t>‹#›</a:t>
             </a:fld>
             <a:endParaRPr lang="en-US"/>
@@ -2669,6 +2696,7 @@
           <a:p>
             <a:fld id="{1617B335-51B0-4314-8176-CDAF0F512FD9}" type="datetimeFigureOut">
               <a:rPr lang="en-US" smtClean="0"/>
+              <a:pPr/>
               <a:t>9/24/2015</a:t>
             </a:fld>
             <a:endParaRPr lang="en-US"/>
@@ -2747,6 +2775,7 @@
           <a:p>
             <a:fld id="{692D2303-E343-4709-A7C1-79D2B34BDE58}" type="slidenum">
               <a:rPr lang="en-US" smtClean="0"/>
+              <a:pPr/>
               <a:t>‹#›</a:t>
             </a:fld>
             <a:endParaRPr lang="en-US"/>
@@ -3170,6 +3199,2050 @@
               <a:t>How do I Git?</a:t>
             </a:r>
             <a:endParaRPr lang="en-US" dirty="0">
+              <a:solidFill>
+                <a:srgbClr val="FFFFFF"/>
+              </a:solidFill>
+            </a:endParaRPr>
+          </a:p>
+        </p:txBody>
+      </p:sp>
+    </p:spTree>
+  </p:cSld>
+  <p:clrMapOvr>
+    <a:masterClrMapping/>
+  </p:clrMapOvr>
+</p:sld>
+</file>
+
+<file path=ppt/slides/slide3.xml><?xml version="1.0" encoding="utf-8"?>
+<p:sld xmlns:a="http://schemas.openxmlformats.org/drawingml/2006/main" xmlns:r="http://schemas.openxmlformats.org/officeDocument/2006/relationships" xmlns:p="http://schemas.openxmlformats.org/presentationml/2006/main">
+  <p:cSld>
+    <p:spTree>
+      <p:nvGrpSpPr>
+        <p:cNvPr id="1" name=""/>
+        <p:cNvGrpSpPr/>
+        <p:nvPr/>
+      </p:nvGrpSpPr>
+      <p:grpSpPr>
+        <a:xfrm>
+          <a:off x="0" y="0"/>
+          <a:ext cx="0" cy="0"/>
+          <a:chOff x="0" y="0"/>
+          <a:chExt cx="0" cy="0"/>
+        </a:xfrm>
+      </p:grpSpPr>
+      <p:sp>
+        <p:nvSpPr>
+          <p:cNvPr id="7" name="Rectangle 6"/>
+          <p:cNvSpPr/>
+          <p:nvPr/>
+        </p:nvSpPr>
+        <p:spPr>
+          <a:xfrm>
+            <a:off x="1371600" y="3276600"/>
+            <a:ext cx="6400800" cy="3124200"/>
+          </a:xfrm>
+          <a:prstGeom prst="rect">
+            <a:avLst/>
+          </a:prstGeom>
+          <a:solidFill>
+            <a:srgbClr val="FFFFFF"/>
+          </a:solidFill>
+          <a:ln>
+            <a:noFill/>
+          </a:ln>
+        </p:spPr>
+        <p:style>
+          <a:lnRef idx="2">
+            <a:schemeClr val="accent1">
+              <a:shade val="50000"/>
+            </a:schemeClr>
+          </a:lnRef>
+          <a:fillRef idx="1">
+            <a:schemeClr val="accent1"/>
+          </a:fillRef>
+          <a:effectRef idx="0">
+            <a:schemeClr val="accent1"/>
+          </a:effectRef>
+          <a:fontRef idx="minor">
+            <a:schemeClr val="lt1"/>
+          </a:fontRef>
+        </p:style>
+        <p:txBody>
+          <a:bodyPr rtlCol="0" anchor="ctr"/>
+          <a:lstStyle/>
+          <a:p>
+            <a:pPr algn="ctr"/>
+            <a:endParaRPr lang="en-US"/>
+          </a:p>
+        </p:txBody>
+      </p:sp>
+      <p:sp>
+        <p:nvSpPr>
+          <p:cNvPr id="2" name="Title 1"/>
+          <p:cNvSpPr>
+            <a:spLocks noGrp="1"/>
+          </p:cNvSpPr>
+          <p:nvPr>
+            <p:ph type="title"/>
+          </p:nvPr>
+        </p:nvSpPr>
+        <p:spPr/>
+        <p:txBody>
+          <a:bodyPr/>
+          <a:lstStyle/>
+          <a:p>
+            <a:r>
+              <a:rPr lang="en-US" dirty="0" smtClean="0">
+                <a:solidFill>
+                  <a:srgbClr val="FFFFFF"/>
+                </a:solidFill>
+              </a:rPr>
+              <a:t>What is Git?</a:t>
+            </a:r>
+            <a:endParaRPr lang="en-US" dirty="0">
+              <a:solidFill>
+                <a:srgbClr val="FFFFFF"/>
+              </a:solidFill>
+            </a:endParaRPr>
+          </a:p>
+        </p:txBody>
+      </p:sp>
+      <p:sp>
+        <p:nvSpPr>
+          <p:cNvPr id="3" name="Content Placeholder 2"/>
+          <p:cNvSpPr>
+            <a:spLocks noGrp="1"/>
+          </p:cNvSpPr>
+          <p:nvPr>
+            <p:ph idx="1"/>
+          </p:nvPr>
+        </p:nvSpPr>
+        <p:spPr>
+          <a:xfrm>
+            <a:off x="457200" y="1600201"/>
+            <a:ext cx="8229600" cy="1295400"/>
+          </a:xfrm>
+        </p:spPr>
+        <p:txBody>
+          <a:bodyPr/>
+          <a:lstStyle/>
+          <a:p>
+            <a:r>
+              <a:rPr lang="en-US" dirty="0" smtClean="0">
+                <a:solidFill>
+                  <a:srgbClr val="FFFFFF"/>
+                </a:solidFill>
+              </a:rPr>
+              <a:t>Version control system</a:t>
+            </a:r>
+          </a:p>
+          <a:p>
+            <a:r>
+              <a:rPr lang="en-US" dirty="0" smtClean="0">
+                <a:solidFill>
+                  <a:srgbClr val="FFFFFF"/>
+                </a:solidFill>
+              </a:rPr>
+              <a:t>Allows easy collaboration on same stuff</a:t>
+            </a:r>
+            <a:endParaRPr lang="en-US" dirty="0">
+              <a:solidFill>
+                <a:srgbClr val="FFFFFF"/>
+              </a:solidFill>
+            </a:endParaRPr>
+          </a:p>
+        </p:txBody>
+      </p:sp>
+      <p:pic>
+        <p:nvPicPr>
+          <p:cNvPr id="2052" name="Picture 4" descr="https://upload.wikimedia.org/wikipedia/commons/thumb/e/e0/Git-logo.svg/2000px-Git-logo.svg.png"/>
+          <p:cNvPicPr>
+            <a:picLocks noChangeAspect="1" noChangeArrowheads="1"/>
+          </p:cNvPicPr>
+          <p:nvPr/>
+        </p:nvPicPr>
+        <p:blipFill>
+          <a:blip r:embed="rId2" cstate="print"/>
+          <a:srcRect/>
+          <a:stretch>
+            <a:fillRect/>
+          </a:stretch>
+        </p:blipFill>
+        <p:spPr bwMode="auto">
+          <a:xfrm>
+            <a:off x="2071688" y="3810000"/>
+            <a:ext cx="5000625" cy="2085976"/>
+          </a:xfrm>
+          <a:prstGeom prst="rect">
+            <a:avLst/>
+          </a:prstGeom>
+          <a:noFill/>
+        </p:spPr>
+      </p:pic>
+    </p:spTree>
+  </p:cSld>
+  <p:clrMapOvr>
+    <a:masterClrMapping/>
+  </p:clrMapOvr>
+</p:sld>
+</file>
+
+<file path=ppt/slides/slide4.xml><?xml version="1.0" encoding="utf-8"?>
+<p:sld xmlns:a="http://schemas.openxmlformats.org/drawingml/2006/main" xmlns:r="http://schemas.openxmlformats.org/officeDocument/2006/relationships" xmlns:p="http://schemas.openxmlformats.org/presentationml/2006/main">
+  <p:cSld>
+    <p:spTree>
+      <p:nvGrpSpPr>
+        <p:cNvPr id="1" name=""/>
+        <p:cNvGrpSpPr/>
+        <p:nvPr/>
+      </p:nvGrpSpPr>
+      <p:grpSpPr>
+        <a:xfrm>
+          <a:off x="0" y="0"/>
+          <a:ext cx="0" cy="0"/>
+          <a:chOff x="0" y="0"/>
+          <a:chExt cx="0" cy="0"/>
+        </a:xfrm>
+      </p:grpSpPr>
+      <p:pic>
+        <p:nvPicPr>
+          <p:cNvPr id="1039" name="Picture 15" descr="C:\Users\Alex\AppData\Local\Microsoft\Windows\Temporary Internet Files\Content.IE5\T086Z100\cloud-297786_640[1].png"/>
+          <p:cNvPicPr>
+            <a:picLocks noChangeAspect="1" noChangeArrowheads="1"/>
+          </p:cNvPicPr>
+          <p:nvPr/>
+        </p:nvPicPr>
+        <p:blipFill>
+          <a:blip r:embed="rId2" cstate="print"/>
+          <a:srcRect/>
+          <a:stretch>
+            <a:fillRect/>
+          </a:stretch>
+        </p:blipFill>
+        <p:spPr bwMode="auto">
+          <a:xfrm>
+            <a:off x="2292495" y="1524000"/>
+            <a:ext cx="4365785" cy="1878905"/>
+          </a:xfrm>
+          <a:prstGeom prst="rect">
+            <a:avLst/>
+          </a:prstGeom>
+          <a:noFill/>
+        </p:spPr>
+      </p:pic>
+      <p:sp>
+        <p:nvSpPr>
+          <p:cNvPr id="2" name="Title 1"/>
+          <p:cNvSpPr>
+            <a:spLocks noGrp="1"/>
+          </p:cNvSpPr>
+          <p:nvPr>
+            <p:ph type="title"/>
+          </p:nvPr>
+        </p:nvSpPr>
+        <p:spPr/>
+        <p:txBody>
+          <a:bodyPr/>
+          <a:lstStyle/>
+          <a:p>
+            <a:r>
+              <a:rPr lang="en-US" dirty="0" smtClean="0">
+                <a:solidFill>
+                  <a:srgbClr val="FFFFFF"/>
+                </a:solidFill>
+              </a:rPr>
+              <a:t>What is Git?</a:t>
+            </a:r>
+            <a:endParaRPr lang="en-US" dirty="0">
+              <a:solidFill>
+                <a:srgbClr val="FFFFFF"/>
+              </a:solidFill>
+            </a:endParaRPr>
+          </a:p>
+        </p:txBody>
+      </p:sp>
+      <p:sp>
+        <p:nvSpPr>
+          <p:cNvPr id="1026" name="Document"/>
+          <p:cNvSpPr>
+            <a:spLocks noEditPoints="1" noChangeArrowheads="1"/>
+          </p:cNvSpPr>
+          <p:nvPr/>
+        </p:nvSpPr>
+        <p:spPr bwMode="auto">
+          <a:xfrm rot="10800000" flipH="1">
+            <a:off x="-4867275" y="4117975"/>
+            <a:ext cx="1070149" cy="1352550"/>
+          </a:xfrm>
+          <a:custGeom>
+            <a:avLst/>
+            <a:gdLst>
+              <a:gd name="T0" fmla="*/ 10757 w 21600"/>
+              <a:gd name="T1" fmla="*/ 21632 h 21600"/>
+              <a:gd name="T2" fmla="*/ 85 w 21600"/>
+              <a:gd name="T3" fmla="*/ 10849 h 21600"/>
+              <a:gd name="T4" fmla="*/ 10757 w 21600"/>
+              <a:gd name="T5" fmla="*/ 81 h 21600"/>
+              <a:gd name="T6" fmla="*/ 21706 w 21600"/>
+              <a:gd name="T7" fmla="*/ 10652 h 21600"/>
+              <a:gd name="T8" fmla="*/ 10757 w 21600"/>
+              <a:gd name="T9" fmla="*/ 21632 h 21600"/>
+              <a:gd name="T10" fmla="*/ 0 w 21600"/>
+              <a:gd name="T11" fmla="*/ 0 h 21600"/>
+              <a:gd name="T12" fmla="*/ 21600 w 21600"/>
+              <a:gd name="T13" fmla="*/ 0 h 21600"/>
+              <a:gd name="T14" fmla="*/ 21600 w 21600"/>
+              <a:gd name="T15" fmla="*/ 21600 h 21600"/>
+              <a:gd name="T16" fmla="*/ 977 w 21600"/>
+              <a:gd name="T17" fmla="*/ 818 h 21600"/>
+              <a:gd name="T18" fmla="*/ 20622 w 21600"/>
+              <a:gd name="T19" fmla="*/ 16429 h 21600"/>
+            </a:gdLst>
+            <a:ahLst/>
+            <a:cxnLst>
+              <a:cxn ang="0">
+                <a:pos x="T0" y="T1"/>
+              </a:cxn>
+              <a:cxn ang="0">
+                <a:pos x="T2" y="T3"/>
+              </a:cxn>
+              <a:cxn ang="0">
+                <a:pos x="T4" y="T5"/>
+              </a:cxn>
+              <a:cxn ang="0">
+                <a:pos x="T6" y="T7"/>
+              </a:cxn>
+              <a:cxn ang="0">
+                <a:pos x="T8" y="T9"/>
+              </a:cxn>
+              <a:cxn ang="0">
+                <a:pos x="T10" y="T11"/>
+              </a:cxn>
+              <a:cxn ang="0">
+                <a:pos x="T12" y="T13"/>
+              </a:cxn>
+              <a:cxn ang="0">
+                <a:pos x="T14" y="T15"/>
+              </a:cxn>
+            </a:cxnLst>
+            <a:rect l="T16" t="T17" r="T18" b="T19"/>
+            <a:pathLst>
+              <a:path w="21600" h="21600">
+                <a:moveTo>
+                  <a:pt x="10757" y="21632"/>
+                </a:moveTo>
+                <a:lnTo>
+                  <a:pt x="5187" y="21632"/>
+                </a:lnTo>
+                <a:lnTo>
+                  <a:pt x="85" y="17509"/>
+                </a:lnTo>
+                <a:lnTo>
+                  <a:pt x="85" y="10849"/>
+                </a:lnTo>
+                <a:lnTo>
+                  <a:pt x="85" y="81"/>
+                </a:lnTo>
+                <a:lnTo>
+                  <a:pt x="10757" y="81"/>
+                </a:lnTo>
+                <a:lnTo>
+                  <a:pt x="21706" y="81"/>
+                </a:lnTo>
+                <a:lnTo>
+                  <a:pt x="21706" y="10652"/>
+                </a:lnTo>
+                <a:lnTo>
+                  <a:pt x="21706" y="21632"/>
+                </a:lnTo>
+                <a:lnTo>
+                  <a:pt x="10757" y="21632"/>
+                </a:lnTo>
+                <a:close/>
+              </a:path>
+              <a:path w="21600" h="21600">
+                <a:moveTo>
+                  <a:pt x="85" y="17509"/>
+                </a:moveTo>
+                <a:lnTo>
+                  <a:pt x="5187" y="17509"/>
+                </a:lnTo>
+                <a:lnTo>
+                  <a:pt x="5187" y="21632"/>
+                </a:lnTo>
+                <a:lnTo>
+                  <a:pt x="85" y="17509"/>
+                </a:lnTo>
+                <a:close/>
+              </a:path>
+            </a:pathLst>
+          </a:custGeom>
+          <a:solidFill>
+            <a:srgbClr val="D8EBB3"/>
+          </a:solidFill>
+          <a:ln w="9525">
+            <a:solidFill>
+              <a:srgbClr val="000000"/>
+            </a:solidFill>
+            <a:miter lim="800000"/>
+            <a:headEnd/>
+            <a:tailEnd/>
+          </a:ln>
+          <a:effectLst>
+            <a:outerShdw dist="107763" dir="2700000" algn="ctr" rotWithShape="0">
+              <a:srgbClr val="808080"/>
+            </a:outerShdw>
+          </a:effectLst>
+        </p:spPr>
+        <p:txBody>
+          <a:bodyPr vert="horz" wrap="square" lIns="91440" tIns="45720" rIns="91440" bIns="45720" numCol="1" anchor="t" anchorCtr="0" compatLnSpc="1">
+            <a:prstTxWarp prst="textNoShape">
+              <a:avLst/>
+            </a:prstTxWarp>
+          </a:bodyPr>
+          <a:lstStyle/>
+          <a:p>
+            <a:endParaRPr lang="en-US" dirty="0"/>
+          </a:p>
+        </p:txBody>
+      </p:sp>
+      <p:pic>
+        <p:nvPicPr>
+          <p:cNvPr id="1032" name="Picture 8" descr="C:\Program Files (x86)\Microsoft Office\MEDIA\CAGCAT10\j0285750.wmf"/>
+          <p:cNvPicPr>
+            <a:picLocks noChangeAspect="1" noChangeArrowheads="1"/>
+          </p:cNvPicPr>
+          <p:nvPr/>
+        </p:nvPicPr>
+        <p:blipFill>
+          <a:blip r:embed="rId3" cstate="print"/>
+          <a:srcRect/>
+          <a:stretch>
+            <a:fillRect/>
+          </a:stretch>
+        </p:blipFill>
+        <p:spPr bwMode="auto">
+          <a:xfrm>
+            <a:off x="990600" y="4724400"/>
+            <a:ext cx="1824038" cy="1120775"/>
+          </a:xfrm>
+          <a:prstGeom prst="rect">
+            <a:avLst/>
+          </a:prstGeom>
+          <a:noFill/>
+        </p:spPr>
+      </p:pic>
+      <p:sp>
+        <p:nvSpPr>
+          <p:cNvPr id="1033" name="laptop"/>
+          <p:cNvSpPr>
+            <a:spLocks noEditPoints="1" noChangeArrowheads="1"/>
+          </p:cNvSpPr>
+          <p:nvPr/>
+        </p:nvSpPr>
+        <p:spPr bwMode="auto">
+          <a:xfrm>
+            <a:off x="3581400" y="4648200"/>
+            <a:ext cx="1809750" cy="1362075"/>
+          </a:xfrm>
+          <a:custGeom>
+            <a:avLst/>
+            <a:gdLst>
+              <a:gd name="T0" fmla="*/ 3362 w 21600"/>
+              <a:gd name="T1" fmla="*/ 0 h 21600"/>
+              <a:gd name="T2" fmla="*/ 3362 w 21600"/>
+              <a:gd name="T3" fmla="*/ 7173 h 21600"/>
+              <a:gd name="T4" fmla="*/ 18327 w 21600"/>
+              <a:gd name="T5" fmla="*/ 0 h 21600"/>
+              <a:gd name="T6" fmla="*/ 18327 w 21600"/>
+              <a:gd name="T7" fmla="*/ 7173 h 21600"/>
+              <a:gd name="T8" fmla="*/ 10800 w 21600"/>
+              <a:gd name="T9" fmla="*/ 0 h 21600"/>
+              <a:gd name="T10" fmla="*/ 10800 w 21600"/>
+              <a:gd name="T11" fmla="*/ 21600 h 21600"/>
+              <a:gd name="T12" fmla="*/ 0 w 21600"/>
+              <a:gd name="T13" fmla="*/ 21600 h 21600"/>
+              <a:gd name="T14" fmla="*/ 21600 w 21600"/>
+              <a:gd name="T15" fmla="*/ 21600 h 21600"/>
+              <a:gd name="T16" fmla="*/ 4445 w 21600"/>
+              <a:gd name="T17" fmla="*/ 1858 h 21600"/>
+              <a:gd name="T18" fmla="*/ 17311 w 21600"/>
+              <a:gd name="T19" fmla="*/ 12323 h 21600"/>
+            </a:gdLst>
+            <a:ahLst/>
+            <a:cxnLst>
+              <a:cxn ang="0">
+                <a:pos x="T0" y="T1"/>
+              </a:cxn>
+              <a:cxn ang="0">
+                <a:pos x="T2" y="T3"/>
+              </a:cxn>
+              <a:cxn ang="0">
+                <a:pos x="T4" y="T5"/>
+              </a:cxn>
+              <a:cxn ang="0">
+                <a:pos x="T6" y="T7"/>
+              </a:cxn>
+              <a:cxn ang="0">
+                <a:pos x="T8" y="T9"/>
+              </a:cxn>
+              <a:cxn ang="0">
+                <a:pos x="T10" y="T11"/>
+              </a:cxn>
+              <a:cxn ang="0">
+                <a:pos x="T12" y="T13"/>
+              </a:cxn>
+              <a:cxn ang="0">
+                <a:pos x="T14" y="T15"/>
+              </a:cxn>
+            </a:cxnLst>
+            <a:rect l="T16" t="T17" r="T18" b="T19"/>
+            <a:pathLst>
+              <a:path w="21600" h="21600" extrusionOk="0">
+                <a:moveTo>
+                  <a:pt x="3362" y="0"/>
+                </a:moveTo>
+                <a:lnTo>
+                  <a:pt x="18327" y="0"/>
+                </a:lnTo>
+                <a:lnTo>
+                  <a:pt x="18327" y="14347"/>
+                </a:lnTo>
+                <a:lnTo>
+                  <a:pt x="3362" y="14347"/>
+                </a:lnTo>
+                <a:lnTo>
+                  <a:pt x="3362" y="0"/>
+                </a:lnTo>
+                <a:close/>
+              </a:path>
+              <a:path w="21600" h="21600" extrusionOk="0">
+                <a:moveTo>
+                  <a:pt x="3340" y="15068"/>
+                </a:moveTo>
+                <a:lnTo>
+                  <a:pt x="0" y="19877"/>
+                </a:lnTo>
+                <a:lnTo>
+                  <a:pt x="21600" y="19877"/>
+                </a:lnTo>
+                <a:lnTo>
+                  <a:pt x="18327" y="15068"/>
+                </a:lnTo>
+                <a:lnTo>
+                  <a:pt x="3340" y="15068"/>
+                </a:lnTo>
+                <a:close/>
+              </a:path>
+              <a:path w="21600" h="21600" extrusionOk="0">
+                <a:moveTo>
+                  <a:pt x="0" y="19877"/>
+                </a:moveTo>
+                <a:lnTo>
+                  <a:pt x="0" y="21600"/>
+                </a:lnTo>
+                <a:lnTo>
+                  <a:pt x="21600" y="21600"/>
+                </a:lnTo>
+                <a:lnTo>
+                  <a:pt x="21600" y="19877"/>
+                </a:lnTo>
+                <a:lnTo>
+                  <a:pt x="0" y="19877"/>
+                </a:lnTo>
+                <a:close/>
+              </a:path>
+              <a:path w="21600" h="21600" extrusionOk="0">
+                <a:moveTo>
+                  <a:pt x="4186" y="1523"/>
+                </a:moveTo>
+                <a:lnTo>
+                  <a:pt x="17547" y="1523"/>
+                </a:lnTo>
+                <a:lnTo>
+                  <a:pt x="17547" y="12744"/>
+                </a:lnTo>
+                <a:lnTo>
+                  <a:pt x="4186" y="12744"/>
+                </a:lnTo>
+                <a:lnTo>
+                  <a:pt x="4186" y="1523"/>
+                </a:lnTo>
+                <a:close/>
+              </a:path>
+              <a:path w="21600" h="21600" extrusionOk="0">
+                <a:moveTo>
+                  <a:pt x="3318" y="15549"/>
+                </a:moveTo>
+                <a:lnTo>
+                  <a:pt x="2917" y="16110"/>
+                </a:lnTo>
+                <a:lnTo>
+                  <a:pt x="18727" y="16110"/>
+                </a:lnTo>
+                <a:lnTo>
+                  <a:pt x="18327" y="15549"/>
+                </a:lnTo>
+                <a:lnTo>
+                  <a:pt x="3318" y="15549"/>
+                </a:lnTo>
+                <a:close/>
+              </a:path>
+              <a:path w="21600" h="21600" extrusionOk="0">
+                <a:moveTo>
+                  <a:pt x="6213" y="18314"/>
+                </a:moveTo>
+                <a:lnTo>
+                  <a:pt x="5946" y="18875"/>
+                </a:lnTo>
+                <a:lnTo>
+                  <a:pt x="15766" y="18875"/>
+                </a:lnTo>
+                <a:lnTo>
+                  <a:pt x="15499" y="18314"/>
+                </a:lnTo>
+                <a:lnTo>
+                  <a:pt x="6213" y="18314"/>
+                </a:lnTo>
+                <a:close/>
+              </a:path>
+              <a:path w="21600" h="21600" extrusionOk="0">
+                <a:moveTo>
+                  <a:pt x="2828" y="16471"/>
+                </a:moveTo>
+                <a:lnTo>
+                  <a:pt x="2405" y="17072"/>
+                </a:lnTo>
+                <a:lnTo>
+                  <a:pt x="19284" y="17072"/>
+                </a:lnTo>
+                <a:lnTo>
+                  <a:pt x="18839" y="16471"/>
+                </a:lnTo>
+                <a:lnTo>
+                  <a:pt x="2828" y="16471"/>
+                </a:lnTo>
+                <a:close/>
+              </a:path>
+              <a:path w="21600" h="21600" extrusionOk="0">
+                <a:moveTo>
+                  <a:pt x="2316" y="17352"/>
+                </a:moveTo>
+                <a:lnTo>
+                  <a:pt x="1871" y="17953"/>
+                </a:lnTo>
+                <a:lnTo>
+                  <a:pt x="19863" y="17953"/>
+                </a:lnTo>
+                <a:lnTo>
+                  <a:pt x="19395" y="17352"/>
+                </a:lnTo>
+                <a:lnTo>
+                  <a:pt x="2316" y="17352"/>
+                </a:lnTo>
+                <a:close/>
+              </a:path>
+            </a:pathLst>
+          </a:custGeom>
+          <a:solidFill>
+            <a:srgbClr val="C0C0C0"/>
+          </a:solidFill>
+          <a:ln w="9525">
+            <a:solidFill>
+              <a:srgbClr val="000000"/>
+            </a:solidFill>
+            <a:miter lim="800000"/>
+            <a:headEnd/>
+            <a:tailEnd/>
+          </a:ln>
+        </p:spPr>
+        <p:txBody>
+          <a:bodyPr vert="horz" wrap="square" lIns="91440" tIns="45720" rIns="91440" bIns="45720" numCol="1" anchor="t" anchorCtr="0" compatLnSpc="1">
+            <a:prstTxWarp prst="textNoShape">
+              <a:avLst/>
+            </a:prstTxWarp>
+          </a:bodyPr>
+          <a:lstStyle/>
+          <a:p>
+            <a:endParaRPr lang="en-US"/>
+          </a:p>
+        </p:txBody>
+      </p:sp>
+      <p:pic>
+        <p:nvPicPr>
+          <p:cNvPr id="1035" name="Picture 11" descr="C:\Users\Alex\AppData\Local\Microsoft\Windows\Temporary Internet Files\Content.IE5\YUAL63KO\large-desktop-computer-pc-66.6-12852[1].gif"/>
+          <p:cNvPicPr>
+            <a:picLocks noChangeAspect="1" noChangeArrowheads="1"/>
+          </p:cNvPicPr>
+          <p:nvPr/>
+        </p:nvPicPr>
+        <p:blipFill>
+          <a:blip r:embed="rId4" cstate="print"/>
+          <a:srcRect/>
+          <a:stretch>
+            <a:fillRect/>
+          </a:stretch>
+        </p:blipFill>
+        <p:spPr bwMode="auto">
+          <a:xfrm>
+            <a:off x="6172200" y="4267200"/>
+            <a:ext cx="2249776" cy="1979803"/>
+          </a:xfrm>
+          <a:prstGeom prst="rect">
+            <a:avLst/>
+          </a:prstGeom>
+          <a:noFill/>
+        </p:spPr>
+      </p:pic>
+      <p:cxnSp>
+        <p:nvCxnSpPr>
+          <p:cNvPr id="18" name="Straight Arrow Connector 17"/>
+          <p:cNvCxnSpPr/>
+          <p:nvPr/>
+        </p:nvCxnSpPr>
+        <p:spPr>
+          <a:xfrm flipV="1">
+            <a:off x="2438400" y="3505200"/>
+            <a:ext cx="533400" cy="838200"/>
+          </a:xfrm>
+          <a:prstGeom prst="straightConnector1">
+            <a:avLst/>
+          </a:prstGeom>
+          <a:ln>
+            <a:tailEnd type="arrow"/>
+          </a:ln>
+        </p:spPr>
+        <p:style>
+          <a:lnRef idx="1">
+            <a:schemeClr val="accent1"/>
+          </a:lnRef>
+          <a:fillRef idx="0">
+            <a:schemeClr val="accent1"/>
+          </a:fillRef>
+          <a:effectRef idx="0">
+            <a:schemeClr val="accent1"/>
+          </a:effectRef>
+          <a:fontRef idx="minor">
+            <a:schemeClr val="tx1"/>
+          </a:fontRef>
+        </p:style>
+      </p:cxnSp>
+      <p:cxnSp>
+        <p:nvCxnSpPr>
+          <p:cNvPr id="21" name="Straight Arrow Connector 20"/>
+          <p:cNvCxnSpPr/>
+          <p:nvPr/>
+        </p:nvCxnSpPr>
+        <p:spPr>
+          <a:xfrm flipH="1">
+            <a:off x="2590800" y="3581400"/>
+            <a:ext cx="533400" cy="838200"/>
+          </a:xfrm>
+          <a:prstGeom prst="straightConnector1">
+            <a:avLst/>
+          </a:prstGeom>
+          <a:ln>
+            <a:tailEnd type="arrow"/>
+          </a:ln>
+        </p:spPr>
+        <p:style>
+          <a:lnRef idx="1">
+            <a:schemeClr val="accent1"/>
+          </a:lnRef>
+          <a:fillRef idx="0">
+            <a:schemeClr val="accent1"/>
+          </a:fillRef>
+          <a:effectRef idx="0">
+            <a:schemeClr val="accent1"/>
+          </a:effectRef>
+          <a:fontRef idx="minor">
+            <a:schemeClr val="tx1"/>
+          </a:fontRef>
+        </p:style>
+      </p:cxnSp>
+      <p:cxnSp>
+        <p:nvCxnSpPr>
+          <p:cNvPr id="23" name="Straight Arrow Connector 22"/>
+          <p:cNvCxnSpPr/>
+          <p:nvPr/>
+        </p:nvCxnSpPr>
+        <p:spPr>
+          <a:xfrm flipV="1">
+            <a:off x="4419600" y="3581400"/>
+            <a:ext cx="0" cy="914400"/>
+          </a:xfrm>
+          <a:prstGeom prst="straightConnector1">
+            <a:avLst/>
+          </a:prstGeom>
+          <a:ln>
+            <a:tailEnd type="arrow"/>
+          </a:ln>
+        </p:spPr>
+        <p:style>
+          <a:lnRef idx="1">
+            <a:schemeClr val="accent1"/>
+          </a:lnRef>
+          <a:fillRef idx="0">
+            <a:schemeClr val="accent1"/>
+          </a:fillRef>
+          <a:effectRef idx="0">
+            <a:schemeClr val="accent1"/>
+          </a:effectRef>
+          <a:fontRef idx="minor">
+            <a:schemeClr val="tx1"/>
+          </a:fontRef>
+        </p:style>
+      </p:cxnSp>
+      <p:cxnSp>
+        <p:nvCxnSpPr>
+          <p:cNvPr id="25" name="Straight Arrow Connector 24"/>
+          <p:cNvCxnSpPr/>
+          <p:nvPr/>
+        </p:nvCxnSpPr>
+        <p:spPr>
+          <a:xfrm>
+            <a:off x="4572000" y="3581400"/>
+            <a:ext cx="0" cy="914400"/>
+          </a:xfrm>
+          <a:prstGeom prst="straightConnector1">
+            <a:avLst/>
+          </a:prstGeom>
+          <a:ln>
+            <a:tailEnd type="arrow"/>
+          </a:ln>
+        </p:spPr>
+        <p:style>
+          <a:lnRef idx="1">
+            <a:schemeClr val="accent1"/>
+          </a:lnRef>
+          <a:fillRef idx="0">
+            <a:schemeClr val="accent1"/>
+          </a:fillRef>
+          <a:effectRef idx="0">
+            <a:schemeClr val="accent1"/>
+          </a:effectRef>
+          <a:fontRef idx="minor">
+            <a:schemeClr val="tx1"/>
+          </a:fontRef>
+        </p:style>
+      </p:cxnSp>
+      <p:cxnSp>
+        <p:nvCxnSpPr>
+          <p:cNvPr id="27" name="Straight Arrow Connector 26"/>
+          <p:cNvCxnSpPr/>
+          <p:nvPr/>
+        </p:nvCxnSpPr>
+        <p:spPr>
+          <a:xfrm flipH="1" flipV="1">
+            <a:off x="5867400" y="3581400"/>
+            <a:ext cx="762000" cy="914400"/>
+          </a:xfrm>
+          <a:prstGeom prst="straightConnector1">
+            <a:avLst/>
+          </a:prstGeom>
+          <a:ln>
+            <a:tailEnd type="arrow"/>
+          </a:ln>
+        </p:spPr>
+        <p:style>
+          <a:lnRef idx="1">
+            <a:schemeClr val="accent1"/>
+          </a:lnRef>
+          <a:fillRef idx="0">
+            <a:schemeClr val="accent1"/>
+          </a:fillRef>
+          <a:effectRef idx="0">
+            <a:schemeClr val="accent1"/>
+          </a:effectRef>
+          <a:fontRef idx="minor">
+            <a:schemeClr val="tx1"/>
+          </a:fontRef>
+        </p:style>
+      </p:cxnSp>
+      <p:cxnSp>
+        <p:nvCxnSpPr>
+          <p:cNvPr id="29" name="Straight Arrow Connector 28"/>
+          <p:cNvCxnSpPr/>
+          <p:nvPr/>
+        </p:nvCxnSpPr>
+        <p:spPr>
+          <a:xfrm>
+            <a:off x="6019800" y="3505200"/>
+            <a:ext cx="762000" cy="914400"/>
+          </a:xfrm>
+          <a:prstGeom prst="straightConnector1">
+            <a:avLst/>
+          </a:prstGeom>
+          <a:ln>
+            <a:tailEnd type="arrow"/>
+          </a:ln>
+        </p:spPr>
+        <p:style>
+          <a:lnRef idx="1">
+            <a:schemeClr val="accent1"/>
+          </a:lnRef>
+          <a:fillRef idx="0">
+            <a:schemeClr val="accent1"/>
+          </a:fillRef>
+          <a:effectRef idx="0">
+            <a:schemeClr val="accent1"/>
+          </a:effectRef>
+          <a:fontRef idx="minor">
+            <a:schemeClr val="tx1"/>
+          </a:fontRef>
+        </p:style>
+      </p:cxnSp>
+      <p:pic>
+        <p:nvPicPr>
+          <p:cNvPr id="1041" name="Picture 17" descr="http://www.aha.io/assets/integration_logos/github-bb449e0ffbacbcb7f9c703db85b1cf0b.png"/>
+          <p:cNvPicPr>
+            <a:picLocks noChangeAspect="1" noChangeArrowheads="1"/>
+          </p:cNvPicPr>
+          <p:nvPr/>
+        </p:nvPicPr>
+        <p:blipFill>
+          <a:blip r:embed="rId5" cstate="print"/>
+          <a:srcRect/>
+          <a:stretch>
+            <a:fillRect/>
+          </a:stretch>
+        </p:blipFill>
+        <p:spPr bwMode="auto">
+          <a:xfrm>
+            <a:off x="2590800" y="1905000"/>
+            <a:ext cx="3968895" cy="1474162"/>
+          </a:xfrm>
+          <a:prstGeom prst="rect">
+            <a:avLst/>
+          </a:prstGeom>
+          <a:noFill/>
+        </p:spPr>
+      </p:pic>
+      <p:pic>
+        <p:nvPicPr>
+          <p:cNvPr id="1043" name="Picture 19" descr="https://git-for-windows.github.io/img/git_logo.png"/>
+          <p:cNvPicPr>
+            <a:picLocks noChangeAspect="1" noChangeArrowheads="1"/>
+          </p:cNvPicPr>
+          <p:nvPr/>
+        </p:nvPicPr>
+        <p:blipFill>
+          <a:blip r:embed="rId6" cstate="print"/>
+          <a:srcRect/>
+          <a:stretch>
+            <a:fillRect/>
+          </a:stretch>
+        </p:blipFill>
+        <p:spPr bwMode="auto">
+          <a:xfrm>
+            <a:off x="4191000" y="4800600"/>
+            <a:ext cx="609600" cy="609600"/>
+          </a:xfrm>
+          <a:prstGeom prst="rect">
+            <a:avLst/>
+          </a:prstGeom>
+          <a:noFill/>
+        </p:spPr>
+      </p:pic>
+      <p:pic>
+        <p:nvPicPr>
+          <p:cNvPr id="38" name="Picture 19" descr="https://git-for-windows.github.io/img/git_logo.png"/>
+          <p:cNvPicPr>
+            <a:picLocks noChangeAspect="1" noChangeArrowheads="1"/>
+          </p:cNvPicPr>
+          <p:nvPr/>
+        </p:nvPicPr>
+        <p:blipFill>
+          <a:blip r:embed="rId6" cstate="print"/>
+          <a:srcRect/>
+          <a:stretch>
+            <a:fillRect/>
+          </a:stretch>
+        </p:blipFill>
+        <p:spPr bwMode="auto">
+          <a:xfrm>
+            <a:off x="1524000" y="4876800"/>
+            <a:ext cx="333375" cy="533400"/>
+          </a:xfrm>
+          <a:prstGeom prst="rect">
+            <a:avLst/>
+          </a:prstGeom>
+          <a:noFill/>
+        </p:spPr>
+      </p:pic>
+      <p:pic>
+        <p:nvPicPr>
+          <p:cNvPr id="39" name="Picture 19" descr="https://git-for-windows.github.io/img/git_logo.png"/>
+          <p:cNvPicPr>
+            <a:picLocks noChangeAspect="1" noChangeArrowheads="1"/>
+          </p:cNvPicPr>
+          <p:nvPr/>
+        </p:nvPicPr>
+        <p:blipFill>
+          <a:blip r:embed="rId7" cstate="print"/>
+          <a:srcRect/>
+          <a:stretch>
+            <a:fillRect/>
+          </a:stretch>
+        </p:blipFill>
+        <p:spPr bwMode="auto">
+          <a:xfrm>
+            <a:off x="7315200" y="5105400"/>
+            <a:ext cx="304800" cy="381000"/>
+          </a:xfrm>
+          <a:prstGeom prst="rect">
+            <a:avLst/>
+          </a:prstGeom>
+          <a:noFill/>
+        </p:spPr>
+      </p:pic>
+    </p:spTree>
+  </p:cSld>
+  <p:clrMapOvr>
+    <a:masterClrMapping/>
+  </p:clrMapOvr>
+</p:sld>
+</file>
+
+<file path=ppt/slides/slide5.xml><?xml version="1.0" encoding="utf-8"?>
+<p:sld xmlns:a="http://schemas.openxmlformats.org/drawingml/2006/main" xmlns:r="http://schemas.openxmlformats.org/officeDocument/2006/relationships" xmlns:p="http://schemas.openxmlformats.org/presentationml/2006/main">
+  <p:cSld>
+    <p:spTree>
+      <p:nvGrpSpPr>
+        <p:cNvPr id="1" name=""/>
+        <p:cNvGrpSpPr/>
+        <p:nvPr/>
+      </p:nvGrpSpPr>
+      <p:grpSpPr>
+        <a:xfrm>
+          <a:off x="0" y="0"/>
+          <a:ext cx="0" cy="0"/>
+          <a:chOff x="0" y="0"/>
+          <a:chExt cx="0" cy="0"/>
+        </a:xfrm>
+      </p:grpSpPr>
+      <p:sp>
+        <p:nvSpPr>
+          <p:cNvPr id="2" name="Title 1"/>
+          <p:cNvSpPr>
+            <a:spLocks noGrp="1"/>
+          </p:cNvSpPr>
+          <p:nvPr>
+            <p:ph type="title"/>
+          </p:nvPr>
+        </p:nvSpPr>
+        <p:spPr/>
+        <p:txBody>
+          <a:bodyPr/>
+          <a:lstStyle/>
+          <a:p>
+            <a:r>
+              <a:rPr lang="en-US" dirty="0" smtClean="0">
+                <a:solidFill>
+                  <a:srgbClr val="FFFFFF"/>
+                </a:solidFill>
+              </a:rPr>
+              <a:t>Why should I Git?</a:t>
+            </a:r>
+            <a:endParaRPr lang="en-US" dirty="0">
+              <a:solidFill>
+                <a:srgbClr val="FFFFFF"/>
+              </a:solidFill>
+            </a:endParaRPr>
+          </a:p>
+        </p:txBody>
+      </p:sp>
+      <p:sp>
+        <p:nvSpPr>
+          <p:cNvPr id="3" name="Content Placeholder 2"/>
+          <p:cNvSpPr>
+            <a:spLocks noGrp="1"/>
+          </p:cNvSpPr>
+          <p:nvPr>
+            <p:ph idx="1"/>
+          </p:nvPr>
+        </p:nvSpPr>
+        <p:spPr/>
+        <p:txBody>
+          <a:bodyPr/>
+          <a:lstStyle/>
+          <a:p>
+            <a:r>
+              <a:rPr lang="en-US" dirty="0" smtClean="0">
+                <a:solidFill>
+                  <a:srgbClr val="FFFFFF"/>
+                </a:solidFill>
+              </a:rPr>
+              <a:t>Widely used in industry</a:t>
+            </a:r>
+          </a:p>
+          <a:p>
+            <a:r>
+              <a:rPr lang="en-US" dirty="0" smtClean="0">
+                <a:solidFill>
+                  <a:srgbClr val="FFFFFF"/>
+                </a:solidFill>
+              </a:rPr>
+              <a:t>Makes collaboration easy</a:t>
+            </a:r>
+          </a:p>
+          <a:p>
+            <a:r>
+              <a:rPr lang="en-US" dirty="0" smtClean="0">
+                <a:solidFill>
+                  <a:srgbClr val="FFFFFF"/>
+                </a:solidFill>
+              </a:rPr>
+              <a:t>Needed to pass your classes</a:t>
+            </a:r>
+            <a:endParaRPr lang="en-US" dirty="0">
+              <a:solidFill>
+                <a:srgbClr val="FFFFFF"/>
+              </a:solidFill>
+            </a:endParaRPr>
+          </a:p>
+        </p:txBody>
+      </p:sp>
+    </p:spTree>
+  </p:cSld>
+  <p:clrMapOvr>
+    <a:masterClrMapping/>
+  </p:clrMapOvr>
+</p:sld>
+</file>
+
+<file path=ppt/slides/slide6.xml><?xml version="1.0" encoding="utf-8"?>
+<p:sld xmlns:a="http://schemas.openxmlformats.org/drawingml/2006/main" xmlns:r="http://schemas.openxmlformats.org/officeDocument/2006/relationships" xmlns:p="http://schemas.openxmlformats.org/presentationml/2006/main">
+  <p:cSld>
+    <p:spTree>
+      <p:nvGrpSpPr>
+        <p:cNvPr id="1" name=""/>
+        <p:cNvGrpSpPr/>
+        <p:nvPr/>
+      </p:nvGrpSpPr>
+      <p:grpSpPr>
+        <a:xfrm>
+          <a:off x="0" y="0"/>
+          <a:ext cx="0" cy="0"/>
+          <a:chOff x="0" y="0"/>
+          <a:chExt cx="0" cy="0"/>
+        </a:xfrm>
+      </p:grpSpPr>
+      <p:sp>
+        <p:nvSpPr>
+          <p:cNvPr id="2" name="Title 1"/>
+          <p:cNvSpPr>
+            <a:spLocks noGrp="1"/>
+          </p:cNvSpPr>
+          <p:nvPr>
+            <p:ph type="title"/>
+          </p:nvPr>
+        </p:nvSpPr>
+        <p:spPr/>
+        <p:txBody>
+          <a:bodyPr/>
+          <a:lstStyle/>
+          <a:p>
+            <a:r>
+              <a:rPr lang="en-US" dirty="0" smtClean="0">
+                <a:solidFill>
+                  <a:srgbClr val="FFFFFF"/>
+                </a:solidFill>
+              </a:rPr>
+              <a:t>Getting Git</a:t>
+            </a:r>
+            <a:endParaRPr lang="en-US" dirty="0">
+              <a:solidFill>
+                <a:srgbClr val="FFFFFF"/>
+              </a:solidFill>
+            </a:endParaRPr>
+          </a:p>
+        </p:txBody>
+      </p:sp>
+      <p:sp>
+        <p:nvSpPr>
+          <p:cNvPr id="3" name="Content Placeholder 2"/>
+          <p:cNvSpPr>
+            <a:spLocks noGrp="1"/>
+          </p:cNvSpPr>
+          <p:nvPr>
+            <p:ph idx="1"/>
+          </p:nvPr>
+        </p:nvSpPr>
+        <p:spPr/>
+        <p:txBody>
+          <a:bodyPr/>
+          <a:lstStyle/>
+          <a:p>
+            <a:r>
+              <a:rPr lang="en-US" dirty="0" smtClean="0">
+                <a:solidFill>
+                  <a:srgbClr val="FFFFFF"/>
+                </a:solidFill>
+              </a:rPr>
+              <a:t>Account on </a:t>
+            </a:r>
+            <a:r>
+              <a:rPr lang="en-US" dirty="0" err="1" smtClean="0">
+                <a:solidFill>
+                  <a:srgbClr val="FFFFFF"/>
+                </a:solidFill>
+              </a:rPr>
+              <a:t>GitHub</a:t>
+            </a:r>
+            <a:endParaRPr lang="en-US" dirty="0" smtClean="0">
+              <a:solidFill>
+                <a:srgbClr val="FFFFFF"/>
+              </a:solidFill>
+            </a:endParaRPr>
+          </a:p>
+          <a:p>
+            <a:endParaRPr lang="en-US" dirty="0" smtClean="0">
+              <a:solidFill>
+                <a:srgbClr val="FFFFFF"/>
+              </a:solidFill>
+            </a:endParaRPr>
+          </a:p>
+          <a:p>
+            <a:endParaRPr lang="en-US" dirty="0" smtClean="0">
+              <a:solidFill>
+                <a:srgbClr val="FFFFFF"/>
+              </a:solidFill>
+            </a:endParaRPr>
+          </a:p>
+          <a:p>
+            <a:endParaRPr lang="en-US" dirty="0" smtClean="0">
+              <a:solidFill>
+                <a:srgbClr val="FFFFFF"/>
+              </a:solidFill>
+            </a:endParaRPr>
+          </a:p>
+          <a:p>
+            <a:r>
+              <a:rPr lang="en-US" dirty="0" smtClean="0">
+                <a:solidFill>
+                  <a:srgbClr val="FFFFFF"/>
+                </a:solidFill>
+              </a:rPr>
+              <a:t>Software on your machine</a:t>
+            </a:r>
+            <a:endParaRPr lang="en-US" dirty="0" smtClean="0">
+              <a:solidFill>
+                <a:srgbClr val="FFFFFF"/>
+              </a:solidFill>
+            </a:endParaRPr>
+          </a:p>
+        </p:txBody>
+      </p:sp>
+      <p:grpSp>
+        <p:nvGrpSpPr>
+          <p:cNvPr id="8" name="Group 7"/>
+          <p:cNvGrpSpPr/>
+          <p:nvPr/>
+        </p:nvGrpSpPr>
+        <p:grpSpPr>
+          <a:xfrm>
+            <a:off x="2971800" y="2362200"/>
+            <a:ext cx="3229280" cy="1389787"/>
+            <a:chOff x="1100414" y="2391364"/>
+            <a:chExt cx="3229280" cy="1389787"/>
+          </a:xfrm>
+        </p:grpSpPr>
+        <p:pic>
+          <p:nvPicPr>
+            <p:cNvPr id="4" name="Picture 15" descr="C:\Users\Alex\AppData\Local\Microsoft\Windows\Temporary Internet Files\Content.IE5\T086Z100\cloud-297786_640[1].png"/>
+            <p:cNvPicPr>
+              <a:picLocks noChangeAspect="1" noChangeArrowheads="1"/>
+            </p:cNvPicPr>
+            <p:nvPr/>
+          </p:nvPicPr>
+          <p:blipFill>
+            <a:blip r:embed="rId2" cstate="print"/>
+            <a:srcRect/>
+            <a:stretch>
+              <a:fillRect/>
+            </a:stretch>
+          </p:blipFill>
+          <p:spPr bwMode="auto">
+            <a:xfrm>
+              <a:off x="1100414" y="2391364"/>
+              <a:ext cx="3229280" cy="1389787"/>
+            </a:xfrm>
+            <a:prstGeom prst="rect">
+              <a:avLst/>
+            </a:prstGeom>
+            <a:noFill/>
+          </p:spPr>
+        </p:pic>
+        <p:pic>
+          <p:nvPicPr>
+            <p:cNvPr id="5" name="Picture 17" descr="http://www.aha.io/assets/integration_logos/github-bb449e0ffbacbcb7f9c703db85b1cf0b.png"/>
+            <p:cNvPicPr>
+              <a:picLocks noChangeAspect="1" noChangeArrowheads="1"/>
+            </p:cNvPicPr>
+            <p:nvPr/>
+          </p:nvPicPr>
+          <p:blipFill>
+            <a:blip r:embed="rId3" cstate="print"/>
+            <a:srcRect/>
+            <a:stretch>
+              <a:fillRect/>
+            </a:stretch>
+          </p:blipFill>
+          <p:spPr bwMode="auto">
+            <a:xfrm>
+              <a:off x="1295400" y="2667000"/>
+              <a:ext cx="2935709" cy="1090407"/>
+            </a:xfrm>
+            <a:prstGeom prst="rect">
+              <a:avLst/>
+            </a:prstGeom>
+            <a:noFill/>
+          </p:spPr>
+        </p:pic>
+      </p:grpSp>
+      <p:grpSp>
+        <p:nvGrpSpPr>
+          <p:cNvPr id="9" name="Group 8"/>
+          <p:cNvGrpSpPr/>
+          <p:nvPr/>
+        </p:nvGrpSpPr>
+        <p:grpSpPr>
+          <a:xfrm>
+            <a:off x="3962400" y="4876800"/>
+            <a:ext cx="1809750" cy="1362075"/>
+            <a:chOff x="3733800" y="4876800"/>
+            <a:chExt cx="1809750" cy="1362075"/>
+          </a:xfrm>
+        </p:grpSpPr>
+        <p:sp>
+          <p:nvSpPr>
+            <p:cNvPr id="6" name="laptop"/>
+            <p:cNvSpPr>
+              <a:spLocks noEditPoints="1" noChangeArrowheads="1"/>
+            </p:cNvSpPr>
+            <p:nvPr/>
+          </p:nvSpPr>
+          <p:spPr bwMode="auto">
+            <a:xfrm>
+              <a:off x="3733800" y="4876800"/>
+              <a:ext cx="1809750" cy="1362075"/>
+            </a:xfrm>
+            <a:custGeom>
+              <a:avLst/>
+              <a:gdLst>
+                <a:gd name="T0" fmla="*/ 3362 w 21600"/>
+                <a:gd name="T1" fmla="*/ 0 h 21600"/>
+                <a:gd name="T2" fmla="*/ 3362 w 21600"/>
+                <a:gd name="T3" fmla="*/ 7173 h 21600"/>
+                <a:gd name="T4" fmla="*/ 18327 w 21600"/>
+                <a:gd name="T5" fmla="*/ 0 h 21600"/>
+                <a:gd name="T6" fmla="*/ 18327 w 21600"/>
+                <a:gd name="T7" fmla="*/ 7173 h 21600"/>
+                <a:gd name="T8" fmla="*/ 10800 w 21600"/>
+                <a:gd name="T9" fmla="*/ 0 h 21600"/>
+                <a:gd name="T10" fmla="*/ 10800 w 21600"/>
+                <a:gd name="T11" fmla="*/ 21600 h 21600"/>
+                <a:gd name="T12" fmla="*/ 0 w 21600"/>
+                <a:gd name="T13" fmla="*/ 21600 h 21600"/>
+                <a:gd name="T14" fmla="*/ 21600 w 21600"/>
+                <a:gd name="T15" fmla="*/ 21600 h 21600"/>
+                <a:gd name="T16" fmla="*/ 4445 w 21600"/>
+                <a:gd name="T17" fmla="*/ 1858 h 21600"/>
+                <a:gd name="T18" fmla="*/ 17311 w 21600"/>
+                <a:gd name="T19" fmla="*/ 12323 h 21600"/>
+              </a:gdLst>
+              <a:ahLst/>
+              <a:cxnLst>
+                <a:cxn ang="0">
+                  <a:pos x="T0" y="T1"/>
+                </a:cxn>
+                <a:cxn ang="0">
+                  <a:pos x="T2" y="T3"/>
+                </a:cxn>
+                <a:cxn ang="0">
+                  <a:pos x="T4" y="T5"/>
+                </a:cxn>
+                <a:cxn ang="0">
+                  <a:pos x="T6" y="T7"/>
+                </a:cxn>
+                <a:cxn ang="0">
+                  <a:pos x="T8" y="T9"/>
+                </a:cxn>
+                <a:cxn ang="0">
+                  <a:pos x="T10" y="T11"/>
+                </a:cxn>
+                <a:cxn ang="0">
+                  <a:pos x="T12" y="T13"/>
+                </a:cxn>
+                <a:cxn ang="0">
+                  <a:pos x="T14" y="T15"/>
+                </a:cxn>
+              </a:cxnLst>
+              <a:rect l="T16" t="T17" r="T18" b="T19"/>
+              <a:pathLst>
+                <a:path w="21600" h="21600" extrusionOk="0">
+                  <a:moveTo>
+                    <a:pt x="3362" y="0"/>
+                  </a:moveTo>
+                  <a:lnTo>
+                    <a:pt x="18327" y="0"/>
+                  </a:lnTo>
+                  <a:lnTo>
+                    <a:pt x="18327" y="14347"/>
+                  </a:lnTo>
+                  <a:lnTo>
+                    <a:pt x="3362" y="14347"/>
+                  </a:lnTo>
+                  <a:lnTo>
+                    <a:pt x="3362" y="0"/>
+                  </a:lnTo>
+                  <a:close/>
+                </a:path>
+                <a:path w="21600" h="21600" extrusionOk="0">
+                  <a:moveTo>
+                    <a:pt x="3340" y="15068"/>
+                  </a:moveTo>
+                  <a:lnTo>
+                    <a:pt x="0" y="19877"/>
+                  </a:lnTo>
+                  <a:lnTo>
+                    <a:pt x="21600" y="19877"/>
+                  </a:lnTo>
+                  <a:lnTo>
+                    <a:pt x="18327" y="15068"/>
+                  </a:lnTo>
+                  <a:lnTo>
+                    <a:pt x="3340" y="15068"/>
+                  </a:lnTo>
+                  <a:close/>
+                </a:path>
+                <a:path w="21600" h="21600" extrusionOk="0">
+                  <a:moveTo>
+                    <a:pt x="0" y="19877"/>
+                  </a:moveTo>
+                  <a:lnTo>
+                    <a:pt x="0" y="21600"/>
+                  </a:lnTo>
+                  <a:lnTo>
+                    <a:pt x="21600" y="21600"/>
+                  </a:lnTo>
+                  <a:lnTo>
+                    <a:pt x="21600" y="19877"/>
+                  </a:lnTo>
+                  <a:lnTo>
+                    <a:pt x="0" y="19877"/>
+                  </a:lnTo>
+                  <a:close/>
+                </a:path>
+                <a:path w="21600" h="21600" extrusionOk="0">
+                  <a:moveTo>
+                    <a:pt x="4186" y="1523"/>
+                  </a:moveTo>
+                  <a:lnTo>
+                    <a:pt x="17547" y="1523"/>
+                  </a:lnTo>
+                  <a:lnTo>
+                    <a:pt x="17547" y="12744"/>
+                  </a:lnTo>
+                  <a:lnTo>
+                    <a:pt x="4186" y="12744"/>
+                  </a:lnTo>
+                  <a:lnTo>
+                    <a:pt x="4186" y="1523"/>
+                  </a:lnTo>
+                  <a:close/>
+                </a:path>
+                <a:path w="21600" h="21600" extrusionOk="0">
+                  <a:moveTo>
+                    <a:pt x="3318" y="15549"/>
+                  </a:moveTo>
+                  <a:lnTo>
+                    <a:pt x="2917" y="16110"/>
+                  </a:lnTo>
+                  <a:lnTo>
+                    <a:pt x="18727" y="16110"/>
+                  </a:lnTo>
+                  <a:lnTo>
+                    <a:pt x="18327" y="15549"/>
+                  </a:lnTo>
+                  <a:lnTo>
+                    <a:pt x="3318" y="15549"/>
+                  </a:lnTo>
+                  <a:close/>
+                </a:path>
+                <a:path w="21600" h="21600" extrusionOk="0">
+                  <a:moveTo>
+                    <a:pt x="6213" y="18314"/>
+                  </a:moveTo>
+                  <a:lnTo>
+                    <a:pt x="5946" y="18875"/>
+                  </a:lnTo>
+                  <a:lnTo>
+                    <a:pt x="15766" y="18875"/>
+                  </a:lnTo>
+                  <a:lnTo>
+                    <a:pt x="15499" y="18314"/>
+                  </a:lnTo>
+                  <a:lnTo>
+                    <a:pt x="6213" y="18314"/>
+                  </a:lnTo>
+                  <a:close/>
+                </a:path>
+                <a:path w="21600" h="21600" extrusionOk="0">
+                  <a:moveTo>
+                    <a:pt x="2828" y="16471"/>
+                  </a:moveTo>
+                  <a:lnTo>
+                    <a:pt x="2405" y="17072"/>
+                  </a:lnTo>
+                  <a:lnTo>
+                    <a:pt x="19284" y="17072"/>
+                  </a:lnTo>
+                  <a:lnTo>
+                    <a:pt x="18839" y="16471"/>
+                  </a:lnTo>
+                  <a:lnTo>
+                    <a:pt x="2828" y="16471"/>
+                  </a:lnTo>
+                  <a:close/>
+                </a:path>
+                <a:path w="21600" h="21600" extrusionOk="0">
+                  <a:moveTo>
+                    <a:pt x="2316" y="17352"/>
+                  </a:moveTo>
+                  <a:lnTo>
+                    <a:pt x="1871" y="17953"/>
+                  </a:lnTo>
+                  <a:lnTo>
+                    <a:pt x="19863" y="17953"/>
+                  </a:lnTo>
+                  <a:lnTo>
+                    <a:pt x="19395" y="17352"/>
+                  </a:lnTo>
+                  <a:lnTo>
+                    <a:pt x="2316" y="17352"/>
+                  </a:lnTo>
+                  <a:close/>
+                </a:path>
+              </a:pathLst>
+            </a:custGeom>
+            <a:solidFill>
+              <a:srgbClr val="C0C0C0"/>
+            </a:solidFill>
+            <a:ln w="9525">
+              <a:solidFill>
+                <a:srgbClr val="000000"/>
+              </a:solidFill>
+              <a:miter lim="800000"/>
+              <a:headEnd/>
+              <a:tailEnd/>
+            </a:ln>
+          </p:spPr>
+          <p:txBody>
+            <a:bodyPr vert="horz" wrap="square" lIns="91440" tIns="45720" rIns="91440" bIns="45720" numCol="1" anchor="t" anchorCtr="0" compatLnSpc="1">
+              <a:prstTxWarp prst="textNoShape">
+                <a:avLst/>
+              </a:prstTxWarp>
+            </a:bodyPr>
+            <a:lstStyle/>
+            <a:p>
+              <a:endParaRPr lang="en-US"/>
+            </a:p>
+          </p:txBody>
+        </p:sp>
+        <p:pic>
+          <p:nvPicPr>
+            <p:cNvPr id="7" name="Picture 19" descr="https://git-for-windows.github.io/img/git_logo.png"/>
+            <p:cNvPicPr>
+              <a:picLocks noChangeAspect="1" noChangeArrowheads="1"/>
+            </p:cNvPicPr>
+            <p:nvPr/>
+          </p:nvPicPr>
+          <p:blipFill>
+            <a:blip r:embed="rId4" cstate="print"/>
+            <a:srcRect/>
+            <a:stretch>
+              <a:fillRect/>
+            </a:stretch>
+          </p:blipFill>
+          <p:spPr bwMode="auto">
+            <a:xfrm>
+              <a:off x="4343400" y="5029200"/>
+              <a:ext cx="609600" cy="609600"/>
+            </a:xfrm>
+            <a:prstGeom prst="rect">
+              <a:avLst/>
+            </a:prstGeom>
+            <a:noFill/>
+          </p:spPr>
+        </p:pic>
+      </p:grpSp>
+    </p:spTree>
+  </p:cSld>
+  <p:clrMapOvr>
+    <a:masterClrMapping/>
+  </p:clrMapOvr>
+</p:sld>
+</file>
+
+<file path=ppt/slides/slide7.xml><?xml version="1.0" encoding="utf-8"?>
+<p:sld xmlns:a="http://schemas.openxmlformats.org/drawingml/2006/main" xmlns:r="http://schemas.openxmlformats.org/officeDocument/2006/relationships" xmlns:p="http://schemas.openxmlformats.org/presentationml/2006/main">
+  <p:cSld>
+    <p:spTree>
+      <p:nvGrpSpPr>
+        <p:cNvPr id="1" name=""/>
+        <p:cNvGrpSpPr/>
+        <p:nvPr/>
+      </p:nvGrpSpPr>
+      <p:grpSpPr>
+        <a:xfrm>
+          <a:off x="0" y="0"/>
+          <a:ext cx="0" cy="0"/>
+          <a:chOff x="0" y="0"/>
+          <a:chExt cx="0" cy="0"/>
+        </a:xfrm>
+      </p:grpSpPr>
+      <p:sp>
+        <p:nvSpPr>
+          <p:cNvPr id="2" name="Title 1"/>
+          <p:cNvSpPr>
+            <a:spLocks noGrp="1"/>
+          </p:cNvSpPr>
+          <p:nvPr>
+            <p:ph type="title"/>
+          </p:nvPr>
+        </p:nvSpPr>
+        <p:spPr/>
+        <p:txBody>
+          <a:bodyPr/>
+          <a:lstStyle/>
+          <a:p>
+            <a:r>
+              <a:rPr lang="en-US" dirty="0" smtClean="0">
+                <a:solidFill>
+                  <a:srgbClr val="FFFFFF"/>
+                </a:solidFill>
+              </a:rPr>
+              <a:t>Cloning a Repository</a:t>
+            </a:r>
+            <a:endParaRPr lang="en-US" dirty="0">
+              <a:solidFill>
+                <a:srgbClr val="FFFFFF"/>
+              </a:solidFill>
+            </a:endParaRPr>
+          </a:p>
+        </p:txBody>
+      </p:sp>
+      <p:grpSp>
+        <p:nvGrpSpPr>
+          <p:cNvPr id="8" name="Group 7"/>
+          <p:cNvGrpSpPr/>
+          <p:nvPr/>
+        </p:nvGrpSpPr>
+        <p:grpSpPr>
+          <a:xfrm>
+            <a:off x="5638800" y="1447800"/>
+            <a:ext cx="3229280" cy="1389787"/>
+            <a:chOff x="1100414" y="2391364"/>
+            <a:chExt cx="3229280" cy="1389787"/>
+          </a:xfrm>
+        </p:grpSpPr>
+        <p:pic>
+          <p:nvPicPr>
+            <p:cNvPr id="4" name="Picture 15" descr="C:\Users\Alex\AppData\Local\Microsoft\Windows\Temporary Internet Files\Content.IE5\T086Z100\cloud-297786_640[1].png"/>
+            <p:cNvPicPr>
+              <a:picLocks noChangeAspect="1" noChangeArrowheads="1"/>
+            </p:cNvPicPr>
+            <p:nvPr/>
+          </p:nvPicPr>
+          <p:blipFill>
+            <a:blip r:embed="rId2" cstate="print"/>
+            <a:srcRect/>
+            <a:stretch>
+              <a:fillRect/>
+            </a:stretch>
+          </p:blipFill>
+          <p:spPr bwMode="auto">
+            <a:xfrm>
+              <a:off x="1100414" y="2391364"/>
+              <a:ext cx="3229280" cy="1389787"/>
+            </a:xfrm>
+            <a:prstGeom prst="rect">
+              <a:avLst/>
+            </a:prstGeom>
+            <a:noFill/>
+          </p:spPr>
+        </p:pic>
+        <p:pic>
+          <p:nvPicPr>
+            <p:cNvPr id="5" name="Picture 17" descr="http://www.aha.io/assets/integration_logos/github-bb449e0ffbacbcb7f9c703db85b1cf0b.png"/>
+            <p:cNvPicPr>
+              <a:picLocks noChangeAspect="1" noChangeArrowheads="1"/>
+            </p:cNvPicPr>
+            <p:nvPr/>
+          </p:nvPicPr>
+          <p:blipFill>
+            <a:blip r:embed="rId3" cstate="print"/>
+            <a:srcRect/>
+            <a:stretch>
+              <a:fillRect/>
+            </a:stretch>
+          </p:blipFill>
+          <p:spPr bwMode="auto">
+            <a:xfrm>
+              <a:off x="1295400" y="2667000"/>
+              <a:ext cx="2935709" cy="1090407"/>
+            </a:xfrm>
+            <a:prstGeom prst="rect">
+              <a:avLst/>
+            </a:prstGeom>
+            <a:noFill/>
+          </p:spPr>
+        </p:pic>
+      </p:grpSp>
+      <p:grpSp>
+        <p:nvGrpSpPr>
+          <p:cNvPr id="9" name="Group 8"/>
+          <p:cNvGrpSpPr/>
+          <p:nvPr/>
+        </p:nvGrpSpPr>
+        <p:grpSpPr>
+          <a:xfrm>
+            <a:off x="6934200" y="4648200"/>
+            <a:ext cx="1809750" cy="1362075"/>
+            <a:chOff x="3733800" y="4876800"/>
+            <a:chExt cx="1809750" cy="1362075"/>
+          </a:xfrm>
+        </p:grpSpPr>
+        <p:sp>
+          <p:nvSpPr>
+            <p:cNvPr id="6" name="laptop"/>
+            <p:cNvSpPr>
+              <a:spLocks noEditPoints="1" noChangeArrowheads="1"/>
+            </p:cNvSpPr>
+            <p:nvPr/>
+          </p:nvSpPr>
+          <p:spPr bwMode="auto">
+            <a:xfrm>
+              <a:off x="3733800" y="4876800"/>
+              <a:ext cx="1809750" cy="1362075"/>
+            </a:xfrm>
+            <a:custGeom>
+              <a:avLst/>
+              <a:gdLst>
+                <a:gd name="T0" fmla="*/ 3362 w 21600"/>
+                <a:gd name="T1" fmla="*/ 0 h 21600"/>
+                <a:gd name="T2" fmla="*/ 3362 w 21600"/>
+                <a:gd name="T3" fmla="*/ 7173 h 21600"/>
+                <a:gd name="T4" fmla="*/ 18327 w 21600"/>
+                <a:gd name="T5" fmla="*/ 0 h 21600"/>
+                <a:gd name="T6" fmla="*/ 18327 w 21600"/>
+                <a:gd name="T7" fmla="*/ 7173 h 21600"/>
+                <a:gd name="T8" fmla="*/ 10800 w 21600"/>
+                <a:gd name="T9" fmla="*/ 0 h 21600"/>
+                <a:gd name="T10" fmla="*/ 10800 w 21600"/>
+                <a:gd name="T11" fmla="*/ 21600 h 21600"/>
+                <a:gd name="T12" fmla="*/ 0 w 21600"/>
+                <a:gd name="T13" fmla="*/ 21600 h 21600"/>
+                <a:gd name="T14" fmla="*/ 21600 w 21600"/>
+                <a:gd name="T15" fmla="*/ 21600 h 21600"/>
+                <a:gd name="T16" fmla="*/ 4445 w 21600"/>
+                <a:gd name="T17" fmla="*/ 1858 h 21600"/>
+                <a:gd name="T18" fmla="*/ 17311 w 21600"/>
+                <a:gd name="T19" fmla="*/ 12323 h 21600"/>
+              </a:gdLst>
+              <a:ahLst/>
+              <a:cxnLst>
+                <a:cxn ang="0">
+                  <a:pos x="T0" y="T1"/>
+                </a:cxn>
+                <a:cxn ang="0">
+                  <a:pos x="T2" y="T3"/>
+                </a:cxn>
+                <a:cxn ang="0">
+                  <a:pos x="T4" y="T5"/>
+                </a:cxn>
+                <a:cxn ang="0">
+                  <a:pos x="T6" y="T7"/>
+                </a:cxn>
+                <a:cxn ang="0">
+                  <a:pos x="T8" y="T9"/>
+                </a:cxn>
+                <a:cxn ang="0">
+                  <a:pos x="T10" y="T11"/>
+                </a:cxn>
+                <a:cxn ang="0">
+                  <a:pos x="T12" y="T13"/>
+                </a:cxn>
+                <a:cxn ang="0">
+                  <a:pos x="T14" y="T15"/>
+                </a:cxn>
+              </a:cxnLst>
+              <a:rect l="T16" t="T17" r="T18" b="T19"/>
+              <a:pathLst>
+                <a:path w="21600" h="21600" extrusionOk="0">
+                  <a:moveTo>
+                    <a:pt x="3362" y="0"/>
+                  </a:moveTo>
+                  <a:lnTo>
+                    <a:pt x="18327" y="0"/>
+                  </a:lnTo>
+                  <a:lnTo>
+                    <a:pt x="18327" y="14347"/>
+                  </a:lnTo>
+                  <a:lnTo>
+                    <a:pt x="3362" y="14347"/>
+                  </a:lnTo>
+                  <a:lnTo>
+                    <a:pt x="3362" y="0"/>
+                  </a:lnTo>
+                  <a:close/>
+                </a:path>
+                <a:path w="21600" h="21600" extrusionOk="0">
+                  <a:moveTo>
+                    <a:pt x="3340" y="15068"/>
+                  </a:moveTo>
+                  <a:lnTo>
+                    <a:pt x="0" y="19877"/>
+                  </a:lnTo>
+                  <a:lnTo>
+                    <a:pt x="21600" y="19877"/>
+                  </a:lnTo>
+                  <a:lnTo>
+                    <a:pt x="18327" y="15068"/>
+                  </a:lnTo>
+                  <a:lnTo>
+                    <a:pt x="3340" y="15068"/>
+                  </a:lnTo>
+                  <a:close/>
+                </a:path>
+                <a:path w="21600" h="21600" extrusionOk="0">
+                  <a:moveTo>
+                    <a:pt x="0" y="19877"/>
+                  </a:moveTo>
+                  <a:lnTo>
+                    <a:pt x="0" y="21600"/>
+                  </a:lnTo>
+                  <a:lnTo>
+                    <a:pt x="21600" y="21600"/>
+                  </a:lnTo>
+                  <a:lnTo>
+                    <a:pt x="21600" y="19877"/>
+                  </a:lnTo>
+                  <a:lnTo>
+                    <a:pt x="0" y="19877"/>
+                  </a:lnTo>
+                  <a:close/>
+                </a:path>
+                <a:path w="21600" h="21600" extrusionOk="0">
+                  <a:moveTo>
+                    <a:pt x="4186" y="1523"/>
+                  </a:moveTo>
+                  <a:lnTo>
+                    <a:pt x="17547" y="1523"/>
+                  </a:lnTo>
+                  <a:lnTo>
+                    <a:pt x="17547" y="12744"/>
+                  </a:lnTo>
+                  <a:lnTo>
+                    <a:pt x="4186" y="12744"/>
+                  </a:lnTo>
+                  <a:lnTo>
+                    <a:pt x="4186" y="1523"/>
+                  </a:lnTo>
+                  <a:close/>
+                </a:path>
+                <a:path w="21600" h="21600" extrusionOk="0">
+                  <a:moveTo>
+                    <a:pt x="3318" y="15549"/>
+                  </a:moveTo>
+                  <a:lnTo>
+                    <a:pt x="2917" y="16110"/>
+                  </a:lnTo>
+                  <a:lnTo>
+                    <a:pt x="18727" y="16110"/>
+                  </a:lnTo>
+                  <a:lnTo>
+                    <a:pt x="18327" y="15549"/>
+                  </a:lnTo>
+                  <a:lnTo>
+                    <a:pt x="3318" y="15549"/>
+                  </a:lnTo>
+                  <a:close/>
+                </a:path>
+                <a:path w="21600" h="21600" extrusionOk="0">
+                  <a:moveTo>
+                    <a:pt x="6213" y="18314"/>
+                  </a:moveTo>
+                  <a:lnTo>
+                    <a:pt x="5946" y="18875"/>
+                  </a:lnTo>
+                  <a:lnTo>
+                    <a:pt x="15766" y="18875"/>
+                  </a:lnTo>
+                  <a:lnTo>
+                    <a:pt x="15499" y="18314"/>
+                  </a:lnTo>
+                  <a:lnTo>
+                    <a:pt x="6213" y="18314"/>
+                  </a:lnTo>
+                  <a:close/>
+                </a:path>
+                <a:path w="21600" h="21600" extrusionOk="0">
+                  <a:moveTo>
+                    <a:pt x="2828" y="16471"/>
+                  </a:moveTo>
+                  <a:lnTo>
+                    <a:pt x="2405" y="17072"/>
+                  </a:lnTo>
+                  <a:lnTo>
+                    <a:pt x="19284" y="17072"/>
+                  </a:lnTo>
+                  <a:lnTo>
+                    <a:pt x="18839" y="16471"/>
+                  </a:lnTo>
+                  <a:lnTo>
+                    <a:pt x="2828" y="16471"/>
+                  </a:lnTo>
+                  <a:close/>
+                </a:path>
+                <a:path w="21600" h="21600" extrusionOk="0">
+                  <a:moveTo>
+                    <a:pt x="2316" y="17352"/>
+                  </a:moveTo>
+                  <a:lnTo>
+                    <a:pt x="1871" y="17953"/>
+                  </a:lnTo>
+                  <a:lnTo>
+                    <a:pt x="19863" y="17953"/>
+                  </a:lnTo>
+                  <a:lnTo>
+                    <a:pt x="19395" y="17352"/>
+                  </a:lnTo>
+                  <a:lnTo>
+                    <a:pt x="2316" y="17352"/>
+                  </a:lnTo>
+                  <a:close/>
+                </a:path>
+              </a:pathLst>
+            </a:custGeom>
+            <a:solidFill>
+              <a:srgbClr val="C0C0C0"/>
+            </a:solidFill>
+            <a:ln w="9525">
+              <a:solidFill>
+                <a:srgbClr val="000000"/>
+              </a:solidFill>
+              <a:miter lim="800000"/>
+              <a:headEnd/>
+              <a:tailEnd/>
+            </a:ln>
+          </p:spPr>
+          <p:txBody>
+            <a:bodyPr vert="horz" wrap="square" lIns="91440" tIns="45720" rIns="91440" bIns="45720" numCol="1" anchor="t" anchorCtr="0" compatLnSpc="1">
+              <a:prstTxWarp prst="textNoShape">
+                <a:avLst/>
+              </a:prstTxWarp>
+            </a:bodyPr>
+            <a:lstStyle/>
+            <a:p>
+              <a:endParaRPr lang="en-US"/>
+            </a:p>
+          </p:txBody>
+        </p:sp>
+        <p:pic>
+          <p:nvPicPr>
+            <p:cNvPr id="7" name="Picture 19" descr="https://git-for-windows.github.io/img/git_logo.png"/>
+            <p:cNvPicPr>
+              <a:picLocks noChangeAspect="1" noChangeArrowheads="1"/>
+            </p:cNvPicPr>
+            <p:nvPr/>
+          </p:nvPicPr>
+          <p:blipFill>
+            <a:blip r:embed="rId4" cstate="print"/>
+            <a:srcRect/>
+            <a:stretch>
+              <a:fillRect/>
+            </a:stretch>
+          </p:blipFill>
+          <p:spPr bwMode="auto">
+            <a:xfrm>
+              <a:off x="4343400" y="5029200"/>
+              <a:ext cx="609600" cy="609600"/>
+            </a:xfrm>
+            <a:prstGeom prst="rect">
+              <a:avLst/>
+            </a:prstGeom>
+            <a:noFill/>
+          </p:spPr>
+        </p:pic>
+      </p:grpSp>
+      <p:cxnSp>
+        <p:nvCxnSpPr>
+          <p:cNvPr id="11" name="Straight Arrow Connector 10"/>
+          <p:cNvCxnSpPr/>
+          <p:nvPr/>
+        </p:nvCxnSpPr>
+        <p:spPr>
+          <a:xfrm>
+            <a:off x="7848600" y="3048000"/>
+            <a:ext cx="0" cy="1371600"/>
+          </a:xfrm>
+          <a:prstGeom prst="straightConnector1">
+            <a:avLst/>
+          </a:prstGeom>
+          <a:ln w="50800" cap="sq">
+            <a:tailEnd type="arrow"/>
+          </a:ln>
+        </p:spPr>
+        <p:style>
+          <a:lnRef idx="1">
+            <a:schemeClr val="accent1"/>
+          </a:lnRef>
+          <a:fillRef idx="0">
+            <a:schemeClr val="accent1"/>
+          </a:fillRef>
+          <a:effectRef idx="0">
+            <a:schemeClr val="accent1"/>
+          </a:effectRef>
+          <a:fontRef idx="minor">
+            <a:schemeClr val="tx1"/>
+          </a:fontRef>
+        </p:style>
+      </p:cxnSp>
+      <p:sp>
+        <p:nvSpPr>
+          <p:cNvPr id="15" name="TextBox 14"/>
+          <p:cNvSpPr txBox="1"/>
+          <p:nvPr/>
+        </p:nvSpPr>
+        <p:spPr>
+          <a:xfrm>
+            <a:off x="381000" y="1600200"/>
+            <a:ext cx="4620239" cy="461665"/>
+          </a:xfrm>
+          <a:prstGeom prst="rect">
+            <a:avLst/>
+          </a:prstGeom>
+          <a:noFill/>
+        </p:spPr>
+        <p:txBody>
+          <a:bodyPr wrap="none" rtlCol="0">
+            <a:spAutoFit/>
+          </a:bodyPr>
+          <a:lstStyle/>
+          <a:p>
+            <a:r>
+              <a:rPr lang="en-US" sz="2400" dirty="0" smtClean="0">
+                <a:solidFill>
+                  <a:srgbClr val="FFFFFF"/>
+                </a:solidFill>
+              </a:rPr>
+              <a:t>https://github.com/vgdev/git-guide</a:t>
+            </a:r>
+            <a:endParaRPr lang="en-US" sz="2400" dirty="0">
               <a:solidFill>
                 <a:srgbClr val="FFFFFF"/>
               </a:solidFill>

</xml_diff>